<commit_message>
Addeded training materials for Week 2
</commit_message>
<xml_diff>
--- a/Day 4/Slides/2. Introduction/introduction-slides.pptx
+++ b/Day 4/Slides/2. Introduction/introduction-slides.pptx
@@ -5800,41 +5800,6 @@
           </a:p>
         </p:txBody>
       </p:sp>
-      <p:sp>
-        <p:nvSpPr>
-          <p:cNvPr id="5" name="Text Box 4"/>
-          <p:cNvSpPr txBox="1"/>
-          <p:nvPr/>
-        </p:nvSpPr>
-        <p:spPr>
-          <a:xfrm>
-            <a:off x="2895600" y="9334500"/>
-            <a:ext cx="11706860" cy="583565"/>
-          </a:xfrm>
-          <a:prstGeom prst="rect">
-            <a:avLst/>
-          </a:prstGeom>
-          <a:noFill/>
-        </p:spPr>
-        <p:txBody>
-          <a:bodyPr wrap="square" rtlCol="0">
-            <a:spAutoFit/>
-          </a:bodyPr>
-          <a:p>
-            <a:r>
-              <a:rPr lang="en-US" sz="3200" b="1"/>
-              <a:t>Reference: </a:t>
-            </a:r>
-            <a:r>
-              <a:rPr lang="en-US" sz="3200">
-                <a:hlinkClick r:id="rId1" tooltip="" action="ppaction://hlinkfile"/>
-              </a:rPr>
-              <a:t>https://augury.rangle.io/pages/guides/index.html</a:t>
-            </a:r>
-            <a:endParaRPr lang="en-US" sz="3200"/>
-          </a:p>
-        </p:txBody>
-      </p:sp>
       <p:pic>
         <p:nvPicPr>
           <p:cNvPr id="7" name="Picture 6"/>
@@ -5844,7 +5809,7 @@
           <p:nvPr/>
         </p:nvPicPr>
         <p:blipFill>
-          <a:blip r:embed="rId2"/>
+          <a:blip r:embed="rId1"/>
           <a:stretch>
             <a:fillRect/>
           </a:stretch>
@@ -5859,6 +5824,58 @@
           </a:prstGeom>
         </p:spPr>
       </p:pic>
+      <p:sp>
+        <p:nvSpPr>
+          <p:cNvPr id="2" name="Text Box 1"/>
+          <p:cNvSpPr txBox="1"/>
+          <p:nvPr/>
+        </p:nvSpPr>
+        <p:spPr>
+          <a:xfrm>
+            <a:off x="2895600" y="8877300"/>
+            <a:ext cx="15264765" cy="1076325"/>
+          </a:xfrm>
+          <a:prstGeom prst="rect">
+            <a:avLst/>
+          </a:prstGeom>
+          <a:noFill/>
+        </p:spPr>
+        <p:txBody>
+          <a:bodyPr wrap="square" rtlCol="0">
+            <a:spAutoFit/>
+          </a:bodyPr>
+          <a:p>
+            <a:r>
+              <a:rPr lang="en-US" sz="3200" b="1"/>
+              <a:t>Reference: </a:t>
+            </a:r>
+            <a:r>
+              <a:rPr lang="en-US" sz="3200">
+                <a:hlinkClick r:id="rId2" action="ppaction://hlinkfile"/>
+              </a:rPr>
+              <a:t>https://augury.rangle.io/pages/guides/index.html</a:t>
+            </a:r>
+            <a:r>
+              <a:rPr lang="en-US" sz="3200"/>
+              <a:t>,</a:t>
+            </a:r>
+            <a:endParaRPr lang="en-US" sz="3200"/>
+          </a:p>
+          <a:p>
+            <a:r>
+              <a:rPr lang="en-US" sz="3200"/>
+              <a:t>                    </a:t>
+            </a:r>
+            <a:r>
+              <a:rPr lang="en-US" sz="3200">
+                <a:hlinkClick r:id="rId3" action="ppaction://hlinkfile"/>
+              </a:rPr>
+              <a:t>https://chrome-stats.com/d/elgalmkoelokbchhkhacckoklkejnhcd/download</a:t>
+            </a:r>
+            <a:endParaRPr lang="en-US" sz="3200"/>
+          </a:p>
+        </p:txBody>
+      </p:sp>
     </p:spTree>
   </p:cSld>
   <p:clrMapOvr>

</xml_diff>